<commit_message>
add batch job role
</commit_message>
<xml_diff>
--- a/presentation/aws-batch-runner.pptx
+++ b/presentation/aws-batch-runner.pptx
@@ -2308,7 +2308,7 @@
             <a:fld id="{A5B0A250-5CC0-1746-B209-08E8B0DAE6AF}" type="datetimeFigureOut">
               <a:rPr lang="en-US" smtClean="0"/>
               <a:pPr algn="l"/>
-              <a:t>2/21/2022</a:t>
+              <a:t>2/23/2022</a:t>
             </a:fld>
             <a:endParaRPr lang="en-US" dirty="0"/>
           </a:p>
@@ -3770,7 +3770,7 @@
           <a:p>
             <a:fld id="{A5B0A250-5CC0-1746-B209-08E8B0DAE6AF}" type="datetimeFigureOut">
               <a:rPr lang="en-US" smtClean="0"/>
-              <a:t>2/21/2022</a:t>
+              <a:t>2/23/2022</a:t>
             </a:fld>
             <a:endParaRPr lang="en-US" dirty="0"/>
           </a:p>
@@ -4700,7 +4700,7 @@
           <a:p>
             <a:fld id="{A5B0A250-5CC0-1746-B209-08E8B0DAE6AF}" type="datetimeFigureOut">
               <a:rPr lang="en-US" smtClean="0"/>
-              <a:t>2/21/2022</a:t>
+              <a:t>2/23/2022</a:t>
             </a:fld>
             <a:endParaRPr lang="en-US"/>
           </a:p>
@@ -6157,7 +6157,7 @@
           <a:p>
             <a:fld id="{A5B0A250-5CC0-1746-B209-08E8B0DAE6AF}" type="datetimeFigureOut">
               <a:rPr lang="en-US" smtClean="0"/>
-              <a:t>2/21/2022</a:t>
+              <a:t>2/23/2022</a:t>
             </a:fld>
             <a:endParaRPr lang="en-US" dirty="0"/>
           </a:p>
@@ -8513,7 +8513,7 @@
           <a:p>
             <a:fld id="{A5B0A250-5CC0-1746-B209-08E8B0DAE6AF}" type="datetimeFigureOut">
               <a:rPr lang="en-US" smtClean="0"/>
-              <a:t>2/21/2022</a:t>
+              <a:t>2/23/2022</a:t>
             </a:fld>
             <a:endParaRPr lang="en-US" dirty="0"/>
           </a:p>
@@ -9554,7 +9554,7 @@
           <a:p>
             <a:fld id="{A5B0A250-5CC0-1746-B209-08E8B0DAE6AF}" type="datetimeFigureOut">
               <a:rPr lang="en-US" smtClean="0"/>
-              <a:t>2/21/2022</a:t>
+              <a:t>2/23/2022</a:t>
             </a:fld>
             <a:endParaRPr lang="en-US" dirty="0"/>
           </a:p>
@@ -10767,7 +10767,7 @@
           <a:p>
             <a:fld id="{A5B0A250-5CC0-1746-B209-08E8B0DAE6AF}" type="datetimeFigureOut">
               <a:rPr lang="en-US" smtClean="0"/>
-              <a:t>2/21/2022</a:t>
+              <a:t>2/23/2022</a:t>
             </a:fld>
             <a:endParaRPr lang="en-US" dirty="0"/>
           </a:p>
@@ -11676,7 +11676,7 @@
           <a:p>
             <a:fld id="{A5B0A250-5CC0-1746-B209-08E8B0DAE6AF}" type="datetimeFigureOut">
               <a:rPr lang="en-US" smtClean="0"/>
-              <a:t>2/21/2022</a:t>
+              <a:t>2/23/2022</a:t>
             </a:fld>
             <a:endParaRPr lang="en-US" dirty="0"/>
           </a:p>
@@ -11835,7 +11835,7 @@
             <a:fld id="{A5B0A250-5CC0-1746-B209-08E8B0DAE6AF}" type="datetimeFigureOut">
               <a:rPr lang="en-US" smtClean="0"/>
               <a:pPr/>
-              <a:t>2/21/2022</a:t>
+              <a:t>2/23/2022</a:t>
             </a:fld>
             <a:endParaRPr lang="en-US" dirty="0"/>
           </a:p>
@@ -12818,7 +12818,7 @@
           <a:p>
             <a:fld id="{A5B0A250-5CC0-1746-B209-08E8B0DAE6AF}" type="datetimeFigureOut">
               <a:rPr lang="en-US" smtClean="0"/>
-              <a:t>2/21/2022</a:t>
+              <a:t>2/23/2022</a:t>
             </a:fld>
             <a:endParaRPr lang="en-US" dirty="0"/>
           </a:p>
@@ -13880,7 +13880,7 @@
           <a:p>
             <a:fld id="{A5B0A250-5CC0-1746-B209-08E8B0DAE6AF}" type="datetimeFigureOut">
               <a:rPr lang="en-US" smtClean="0"/>
-              <a:t>2/21/2022</a:t>
+              <a:t>2/23/2022</a:t>
             </a:fld>
             <a:endParaRPr lang="en-US" dirty="0"/>
           </a:p>
@@ -14168,7 +14168,7 @@
             <a:fld id="{A5B0A250-5CC0-1746-B209-08E8B0DAE6AF}" type="datetimeFigureOut">
               <a:rPr lang="en-US" smtClean="0"/>
               <a:pPr/>
-              <a:t>2/21/2022</a:t>
+              <a:t>2/23/2022</a:t>
             </a:fld>
             <a:endParaRPr lang="en-US" dirty="0"/>
           </a:p>
@@ -15779,10 +15779,10 @@
       </p:sp>
       <p:pic>
         <p:nvPicPr>
-          <p:cNvPr id="24" name="Picture 23">
+          <p:cNvPr id="4" name="Picture 3">
             <a:extLst>
               <a:ext uri="{FF2B5EF4-FFF2-40B4-BE49-F238E27FC236}">
-                <a16:creationId xmlns:a16="http://schemas.microsoft.com/office/drawing/2014/main" id="{D8087245-67A0-4310-B777-8CD9343C12AE}"/>
+                <a16:creationId xmlns:a16="http://schemas.microsoft.com/office/drawing/2014/main" id="{EA0C091D-7A9E-4516-8F26-C77CBE9A98C7}"/>
               </a:ext>
             </a:extLst>
           </p:cNvPr>
@@ -15799,8 +15799,8 @@
         </p:blipFill>
         <p:spPr>
           <a:xfrm>
-            <a:off x="1072509" y="1562104"/>
-            <a:ext cx="6496957" cy="4525006"/>
+            <a:off x="803522" y="1405382"/>
+            <a:ext cx="6477904" cy="4401164"/>
           </a:xfrm>
           <a:prstGeom prst="rect">
             <a:avLst/>

</xml_diff>